<commit_message>
Ppt of Group5 made by Team AlkaVats,NikhilVarghese,NitinMittal,Priya and ToshimaSharma on the topic Merge
</commit_message>
<xml_diff>
--- a/MERGE_Grp5.pptx
+++ b/MERGE_Grp5.pptx
@@ -11921,7 +11921,12 @@
             <p:ph type="title"/>
           </p:nvPr>
         </p:nvSpPr>
-        <p:spPr/>
+        <p:spPr>
+          <a:xfrm>
+            <a:off x="581192" y="724350"/>
+            <a:ext cx="11029616" cy="740156"/>
+          </a:xfrm>
+        </p:spPr>
         <p:txBody>
           <a:bodyPr/>
           <a:lstStyle/>
@@ -12084,13 +12089,18 @@
         </p:nvSpPr>
         <p:spPr>
           <a:xfrm>
-            <a:off x="543521" y="1609999"/>
-            <a:ext cx="3858930" cy="400110"/>
+            <a:off x="581192" y="1609999"/>
+            <a:ext cx="3049775" cy="400110"/>
           </a:xfrm>
           <a:prstGeom prst="rect">
             <a:avLst/>
           </a:prstGeom>
           <a:noFill/>
+          <a:ln>
+            <a:solidFill>
+              <a:schemeClr val="tx1"/>
+            </a:solidFill>
+          </a:ln>
         </p:spPr>
         <p:txBody>
           <a:bodyPr wrap="square" rtlCol="0">
@@ -12382,12 +12392,17 @@
         <p:spPr>
           <a:xfrm>
             <a:off x="7297445" y="1846555"/>
-            <a:ext cx="3382392" cy="400110"/>
+            <a:ext cx="3062796" cy="400110"/>
           </a:xfrm>
           <a:prstGeom prst="rect">
             <a:avLst/>
           </a:prstGeom>
           <a:noFill/>
+          <a:ln>
+            <a:solidFill>
+              <a:schemeClr val="tx1"/>
+            </a:solidFill>
+          </a:ln>
         </p:spPr>
         <p:txBody>
           <a:bodyPr wrap="square" rtlCol="0">
@@ -14010,16 +14025,16 @@
           </a:p>
           <a:p>
             <a:r>
+              <a:rPr lang="en-US" sz="2400" dirty="0"/>
+              <a:t>MERGE CONFLICT</a:t>
+            </a:r>
+          </a:p>
+          <a:p>
+            <a:r>
               <a:rPr lang="en-US" sz="2400"/>
-              <a:t>MERGE CONFLICT</a:t>
+              <a:t>VOTE OF THANKS.</a:t>
             </a:r>
             <a:endParaRPr lang="en-US" sz="2400" dirty="0"/>
-          </a:p>
-          <a:p>
-            <a:r>
-              <a:rPr lang="en-US" sz="2400" dirty="0"/>
-              <a:t>THANKS of vote.</a:t>
-            </a:r>
           </a:p>
         </p:txBody>
       </p:sp>
@@ -14383,8 +14398,8 @@
         </p:nvSpPr>
         <p:spPr>
           <a:xfrm>
-            <a:off x="301841" y="2720636"/>
-            <a:ext cx="4142569" cy="3634317"/>
+            <a:off x="394761" y="4025654"/>
+            <a:ext cx="4142569" cy="2472801"/>
           </a:xfrm>
         </p:spPr>
         <p:txBody>
@@ -14459,13 +14474,18 @@
         </p:nvSpPr>
         <p:spPr>
           <a:xfrm>
-            <a:off x="750520" y="2244772"/>
+            <a:off x="450986" y="2832346"/>
             <a:ext cx="3151697" cy="400110"/>
           </a:xfrm>
           <a:prstGeom prst="rect">
             <a:avLst/>
           </a:prstGeom>
           <a:noFill/>
+          <a:ln>
+            <a:solidFill>
+              <a:schemeClr val="tx1"/>
+            </a:solidFill>
+          </a:ln>
         </p:spPr>
         <p:txBody>
           <a:bodyPr wrap="square" rtlCol="0">
@@ -14560,8 +14580,8 @@
         </p:nvSpPr>
         <p:spPr>
           <a:xfrm>
-            <a:off x="6525086" y="1430252"/>
-            <a:ext cx="3417903" cy="369332"/>
+            <a:off x="9235112" y="2275550"/>
+            <a:ext cx="2794131" cy="369332"/>
           </a:xfrm>
           <a:prstGeom prst="rect">
             <a:avLst/>
@@ -14979,6 +14999,11 @@
             <a:avLst/>
           </a:prstGeom>
           <a:noFill/>
+          <a:ln>
+            <a:solidFill>
+              <a:schemeClr val="tx1"/>
+            </a:solidFill>
+          </a:ln>
         </p:spPr>
         <p:txBody>
           <a:bodyPr wrap="square" rtlCol="0">

</xml_diff>